<commit_message>
Update Week 11 Day 1  Neural Networks.pptx
</commit_message>
<xml_diff>
--- a/Week 11 Day 1  Neural Networks.pptx
+++ b/Week 11 Day 1  Neural Networks.pptx
@@ -6318,7 +6318,7 @@
         <p:fade/>
       </p:transition>
     </mc:Choice>
-    <mc:Fallback xmlns:ahyp="http://schemas.microsoft.com/office/drawing/2018/hyperlinkcolor" xmlns:p15="http://schemas.microsoft.com/office/powerpoint/2012/main" xmlns:com="http://schemas.openxmlformats.org/drawingml/2006/compatibility" xmlns:pvml="urn:schemas-microsoft-com:office:powerpoint" xmlns:v="urn:schemas-microsoft-com:vml" xmlns:o="urn:schemas-microsoft-com:office:office" xmlns:dgm="http://schemas.openxmlformats.org/drawingml/2006/diagram" xmlns:c="http://schemas.openxmlformats.org/drawingml/2006/chart" xmlns:mv="urn:schemas-microsoft-com:mac:vml" xmlns="">
+    <mc:Fallback xmlns="" xmlns:mv="urn:schemas-microsoft-com:mac:vml" xmlns:c="http://schemas.openxmlformats.org/drawingml/2006/chart" xmlns:dgm="http://schemas.openxmlformats.org/drawingml/2006/diagram" xmlns:o="urn:schemas-microsoft-com:office:office" xmlns:v="urn:schemas-microsoft-com:vml" xmlns:pvml="urn:schemas-microsoft-com:office:powerpoint" xmlns:com="http://schemas.openxmlformats.org/drawingml/2006/compatibility" xmlns:p15="http://schemas.microsoft.com/office/powerpoint/2012/main" xmlns:ahyp="http://schemas.microsoft.com/office/drawing/2018/hyperlinkcolor">
       <p:transition spd="slow">
         <p:fade/>
       </p:transition>
@@ -6355,7 +6355,7 @@
         <p:fade/>
       </p:transition>
     </mc:Choice>
-    <mc:Fallback xmlns:ahyp="http://schemas.microsoft.com/office/drawing/2018/hyperlinkcolor" xmlns:p15="http://schemas.microsoft.com/office/powerpoint/2012/main" xmlns:com="http://schemas.openxmlformats.org/drawingml/2006/compatibility" xmlns:pvml="urn:schemas-microsoft-com:office:powerpoint" xmlns:v="urn:schemas-microsoft-com:vml" xmlns:o="urn:schemas-microsoft-com:office:office" xmlns:dgm="http://schemas.openxmlformats.org/drawingml/2006/diagram" xmlns:c="http://schemas.openxmlformats.org/drawingml/2006/chart" xmlns:mv="urn:schemas-microsoft-com:mac:vml" xmlns="">
+    <mc:Fallback xmlns="" xmlns:mv="urn:schemas-microsoft-com:mac:vml" xmlns:c="http://schemas.openxmlformats.org/drawingml/2006/chart" xmlns:dgm="http://schemas.openxmlformats.org/drawingml/2006/diagram" xmlns:o="urn:schemas-microsoft-com:office:office" xmlns:v="urn:schemas-microsoft-com:vml" xmlns:pvml="urn:schemas-microsoft-com:office:powerpoint" xmlns:com="http://schemas.openxmlformats.org/drawingml/2006/compatibility" xmlns:p15="http://schemas.microsoft.com/office/powerpoint/2012/main" xmlns:ahyp="http://schemas.microsoft.com/office/drawing/2018/hyperlinkcolor">
       <p:transition spd="slow">
         <p:fade/>
       </p:transition>
@@ -6392,7 +6392,7 @@
         <p:fade/>
       </p:transition>
     </mc:Choice>
-    <mc:Fallback xmlns:ahyp="http://schemas.microsoft.com/office/drawing/2018/hyperlinkcolor" xmlns:p15="http://schemas.microsoft.com/office/powerpoint/2012/main" xmlns:com="http://schemas.openxmlformats.org/drawingml/2006/compatibility" xmlns:pvml="urn:schemas-microsoft-com:office:powerpoint" xmlns:v="urn:schemas-microsoft-com:vml" xmlns:o="urn:schemas-microsoft-com:office:office" xmlns:dgm="http://schemas.openxmlformats.org/drawingml/2006/diagram" xmlns:c="http://schemas.openxmlformats.org/drawingml/2006/chart" xmlns:mv="urn:schemas-microsoft-com:mac:vml" xmlns="">
+    <mc:Fallback xmlns="" xmlns:mv="urn:schemas-microsoft-com:mac:vml" xmlns:c="http://schemas.openxmlformats.org/drawingml/2006/chart" xmlns:dgm="http://schemas.openxmlformats.org/drawingml/2006/diagram" xmlns:o="urn:schemas-microsoft-com:office:office" xmlns:v="urn:schemas-microsoft-com:vml" xmlns:pvml="urn:schemas-microsoft-com:office:powerpoint" xmlns:com="http://schemas.openxmlformats.org/drawingml/2006/compatibility" xmlns:p15="http://schemas.microsoft.com/office/powerpoint/2012/main" xmlns:ahyp="http://schemas.microsoft.com/office/drawing/2018/hyperlinkcolor">
       <p:transition spd="slow">
         <p:fade/>
       </p:transition>
@@ -6429,7 +6429,7 @@
         <p:fade/>
       </p:transition>
     </mc:Choice>
-    <mc:Fallback xmlns:ahyp="http://schemas.microsoft.com/office/drawing/2018/hyperlinkcolor" xmlns:p15="http://schemas.microsoft.com/office/powerpoint/2012/main" xmlns:com="http://schemas.openxmlformats.org/drawingml/2006/compatibility" xmlns:pvml="urn:schemas-microsoft-com:office:powerpoint" xmlns:v="urn:schemas-microsoft-com:vml" xmlns:o="urn:schemas-microsoft-com:office:office" xmlns:dgm="http://schemas.openxmlformats.org/drawingml/2006/diagram" xmlns:c="http://schemas.openxmlformats.org/drawingml/2006/chart" xmlns:mv="urn:schemas-microsoft-com:mac:vml" xmlns="">
+    <mc:Fallback xmlns="" xmlns:mv="urn:schemas-microsoft-com:mac:vml" xmlns:c="http://schemas.openxmlformats.org/drawingml/2006/chart" xmlns:dgm="http://schemas.openxmlformats.org/drawingml/2006/diagram" xmlns:o="urn:schemas-microsoft-com:office:office" xmlns:v="urn:schemas-microsoft-com:vml" xmlns:pvml="urn:schemas-microsoft-com:office:powerpoint" xmlns:com="http://schemas.openxmlformats.org/drawingml/2006/compatibility" xmlns:p15="http://schemas.microsoft.com/office/powerpoint/2012/main" xmlns:ahyp="http://schemas.microsoft.com/office/drawing/2018/hyperlinkcolor">
       <p:transition spd="slow">
         <p:fade/>
       </p:transition>
@@ -7966,7 +7966,7 @@
         <p:fade/>
       </p:transition>
     </mc:Choice>
-    <mc:Fallback xmlns:ahyp="http://schemas.microsoft.com/office/drawing/2018/hyperlinkcolor" xmlns:p15="http://schemas.microsoft.com/office/powerpoint/2012/main" xmlns:com="http://schemas.openxmlformats.org/drawingml/2006/compatibility" xmlns:pvml="urn:schemas-microsoft-com:office:powerpoint" xmlns:v="urn:schemas-microsoft-com:vml" xmlns:o="urn:schemas-microsoft-com:office:office" xmlns:dgm="http://schemas.openxmlformats.org/drawingml/2006/diagram" xmlns:c="http://schemas.openxmlformats.org/drawingml/2006/chart" xmlns:mv="urn:schemas-microsoft-com:mac:vml" xmlns="">
+    <mc:Fallback xmlns="" xmlns:mv="urn:schemas-microsoft-com:mac:vml" xmlns:c="http://schemas.openxmlformats.org/drawingml/2006/chart" xmlns:dgm="http://schemas.openxmlformats.org/drawingml/2006/diagram" xmlns:o="urn:schemas-microsoft-com:office:office" xmlns:v="urn:schemas-microsoft-com:vml" xmlns:pvml="urn:schemas-microsoft-com:office:powerpoint" xmlns:com="http://schemas.openxmlformats.org/drawingml/2006/compatibility" xmlns:p15="http://schemas.microsoft.com/office/powerpoint/2012/main" xmlns:ahyp="http://schemas.microsoft.com/office/drawing/2018/hyperlinkcolor">
       <p:transition spd="slow">
         <p:fade/>
       </p:transition>
@@ -8003,7 +8003,7 @@
         <p:fade/>
       </p:transition>
     </mc:Choice>
-    <mc:Fallback xmlns:ahyp="http://schemas.microsoft.com/office/drawing/2018/hyperlinkcolor" xmlns:p15="http://schemas.microsoft.com/office/powerpoint/2012/main" xmlns:com="http://schemas.openxmlformats.org/drawingml/2006/compatibility" xmlns:pvml="urn:schemas-microsoft-com:office:powerpoint" xmlns:v="urn:schemas-microsoft-com:vml" xmlns:o="urn:schemas-microsoft-com:office:office" xmlns:dgm="http://schemas.openxmlformats.org/drawingml/2006/diagram" xmlns:c="http://schemas.openxmlformats.org/drawingml/2006/chart" xmlns:mv="urn:schemas-microsoft-com:mac:vml" xmlns="">
+    <mc:Fallback xmlns="" xmlns:mv="urn:schemas-microsoft-com:mac:vml" xmlns:c="http://schemas.openxmlformats.org/drawingml/2006/chart" xmlns:dgm="http://schemas.openxmlformats.org/drawingml/2006/diagram" xmlns:o="urn:schemas-microsoft-com:office:office" xmlns:v="urn:schemas-microsoft-com:vml" xmlns:pvml="urn:schemas-microsoft-com:office:powerpoint" xmlns:com="http://schemas.openxmlformats.org/drawingml/2006/compatibility" xmlns:p15="http://schemas.microsoft.com/office/powerpoint/2012/main" xmlns:ahyp="http://schemas.microsoft.com/office/drawing/2018/hyperlinkcolor">
       <p:transition spd="slow">
         <p:fade/>
       </p:transition>
@@ -8040,7 +8040,7 @@
         <p:fade/>
       </p:transition>
     </mc:Choice>
-    <mc:Fallback xmlns:ahyp="http://schemas.microsoft.com/office/drawing/2018/hyperlinkcolor" xmlns:p15="http://schemas.microsoft.com/office/powerpoint/2012/main" xmlns:com="http://schemas.openxmlformats.org/drawingml/2006/compatibility" xmlns:pvml="urn:schemas-microsoft-com:office:powerpoint" xmlns:v="urn:schemas-microsoft-com:vml" xmlns:o="urn:schemas-microsoft-com:office:office" xmlns:dgm="http://schemas.openxmlformats.org/drawingml/2006/diagram" xmlns:c="http://schemas.openxmlformats.org/drawingml/2006/chart" xmlns:mv="urn:schemas-microsoft-com:mac:vml" xmlns="">
+    <mc:Fallback xmlns="" xmlns:mv="urn:schemas-microsoft-com:mac:vml" xmlns:c="http://schemas.openxmlformats.org/drawingml/2006/chart" xmlns:dgm="http://schemas.openxmlformats.org/drawingml/2006/diagram" xmlns:o="urn:schemas-microsoft-com:office:office" xmlns:v="urn:schemas-microsoft-com:vml" xmlns:pvml="urn:schemas-microsoft-com:office:powerpoint" xmlns:com="http://schemas.openxmlformats.org/drawingml/2006/compatibility" xmlns:p15="http://schemas.microsoft.com/office/powerpoint/2012/main" xmlns:ahyp="http://schemas.microsoft.com/office/drawing/2018/hyperlinkcolor">
       <p:transition spd="slow">
         <p:fade/>
       </p:transition>
@@ -8077,7 +8077,7 @@
         <p:fade/>
       </p:transition>
     </mc:Choice>
-    <mc:Fallback xmlns:ahyp="http://schemas.microsoft.com/office/drawing/2018/hyperlinkcolor" xmlns:p15="http://schemas.microsoft.com/office/powerpoint/2012/main" xmlns:com="http://schemas.openxmlformats.org/drawingml/2006/compatibility" xmlns:pvml="urn:schemas-microsoft-com:office:powerpoint" xmlns:v="urn:schemas-microsoft-com:vml" xmlns:o="urn:schemas-microsoft-com:office:office" xmlns:dgm="http://schemas.openxmlformats.org/drawingml/2006/diagram" xmlns:c="http://schemas.openxmlformats.org/drawingml/2006/chart" xmlns:mv="urn:schemas-microsoft-com:mac:vml" xmlns="">
+    <mc:Fallback xmlns="" xmlns:mv="urn:schemas-microsoft-com:mac:vml" xmlns:c="http://schemas.openxmlformats.org/drawingml/2006/chart" xmlns:dgm="http://schemas.openxmlformats.org/drawingml/2006/diagram" xmlns:o="urn:schemas-microsoft-com:office:office" xmlns:v="urn:schemas-microsoft-com:vml" xmlns:pvml="urn:schemas-microsoft-com:office:powerpoint" xmlns:com="http://schemas.openxmlformats.org/drawingml/2006/compatibility" xmlns:p15="http://schemas.microsoft.com/office/powerpoint/2012/main" xmlns:ahyp="http://schemas.microsoft.com/office/drawing/2018/hyperlinkcolor">
       <p:transition spd="slow">
         <p:fade/>
       </p:transition>
@@ -8114,7 +8114,7 @@
         <p:fade/>
       </p:transition>
     </mc:Choice>
-    <mc:Fallback xmlns:ahyp="http://schemas.microsoft.com/office/drawing/2018/hyperlinkcolor" xmlns:p15="http://schemas.microsoft.com/office/powerpoint/2012/main" xmlns:com="http://schemas.openxmlformats.org/drawingml/2006/compatibility" xmlns:pvml="urn:schemas-microsoft-com:office:powerpoint" xmlns:v="urn:schemas-microsoft-com:vml" xmlns:o="urn:schemas-microsoft-com:office:office" xmlns:dgm="http://schemas.openxmlformats.org/drawingml/2006/diagram" xmlns:c="http://schemas.openxmlformats.org/drawingml/2006/chart" xmlns:mv="urn:schemas-microsoft-com:mac:vml" xmlns="">
+    <mc:Fallback xmlns="" xmlns:mv="urn:schemas-microsoft-com:mac:vml" xmlns:c="http://schemas.openxmlformats.org/drawingml/2006/chart" xmlns:dgm="http://schemas.openxmlformats.org/drawingml/2006/diagram" xmlns:o="urn:schemas-microsoft-com:office:office" xmlns:v="urn:schemas-microsoft-com:vml" xmlns:pvml="urn:schemas-microsoft-com:office:powerpoint" xmlns:com="http://schemas.openxmlformats.org/drawingml/2006/compatibility" xmlns:p15="http://schemas.microsoft.com/office/powerpoint/2012/main" xmlns:ahyp="http://schemas.microsoft.com/office/drawing/2018/hyperlinkcolor">
       <p:transition spd="slow">
         <p:fade/>
       </p:transition>
@@ -8151,7 +8151,7 @@
         <p:fade/>
       </p:transition>
     </mc:Choice>
-    <mc:Fallback xmlns:ahyp="http://schemas.microsoft.com/office/drawing/2018/hyperlinkcolor" xmlns:p15="http://schemas.microsoft.com/office/powerpoint/2012/main" xmlns:com="http://schemas.openxmlformats.org/drawingml/2006/compatibility" xmlns:pvml="urn:schemas-microsoft-com:office:powerpoint" xmlns:v="urn:schemas-microsoft-com:vml" xmlns:o="urn:schemas-microsoft-com:office:office" xmlns:dgm="http://schemas.openxmlformats.org/drawingml/2006/diagram" xmlns:c="http://schemas.openxmlformats.org/drawingml/2006/chart" xmlns:mv="urn:schemas-microsoft-com:mac:vml" xmlns="">
+    <mc:Fallback xmlns="" xmlns:mv="urn:schemas-microsoft-com:mac:vml" xmlns:c="http://schemas.openxmlformats.org/drawingml/2006/chart" xmlns:dgm="http://schemas.openxmlformats.org/drawingml/2006/diagram" xmlns:o="urn:schemas-microsoft-com:office:office" xmlns:v="urn:schemas-microsoft-com:vml" xmlns:pvml="urn:schemas-microsoft-com:office:powerpoint" xmlns:com="http://schemas.openxmlformats.org/drawingml/2006/compatibility" xmlns:p15="http://schemas.microsoft.com/office/powerpoint/2012/main" xmlns:ahyp="http://schemas.microsoft.com/office/drawing/2018/hyperlinkcolor">
       <p:transition spd="slow">
         <p:fade/>
       </p:transition>
@@ -8188,7 +8188,7 @@
         <p:fade/>
       </p:transition>
     </mc:Choice>
-    <mc:Fallback xmlns:ahyp="http://schemas.microsoft.com/office/drawing/2018/hyperlinkcolor" xmlns:p15="http://schemas.microsoft.com/office/powerpoint/2012/main" xmlns:com="http://schemas.openxmlformats.org/drawingml/2006/compatibility" xmlns:pvml="urn:schemas-microsoft-com:office:powerpoint" xmlns:v="urn:schemas-microsoft-com:vml" xmlns:o="urn:schemas-microsoft-com:office:office" xmlns:dgm="http://schemas.openxmlformats.org/drawingml/2006/diagram" xmlns:c="http://schemas.openxmlformats.org/drawingml/2006/chart" xmlns:mv="urn:schemas-microsoft-com:mac:vml" xmlns="">
+    <mc:Fallback xmlns="" xmlns:mv="urn:schemas-microsoft-com:mac:vml" xmlns:c="http://schemas.openxmlformats.org/drawingml/2006/chart" xmlns:dgm="http://schemas.openxmlformats.org/drawingml/2006/diagram" xmlns:o="urn:schemas-microsoft-com:office:office" xmlns:v="urn:schemas-microsoft-com:vml" xmlns:pvml="urn:schemas-microsoft-com:office:powerpoint" xmlns:com="http://schemas.openxmlformats.org/drawingml/2006/compatibility" xmlns:p15="http://schemas.microsoft.com/office/powerpoint/2012/main" xmlns:ahyp="http://schemas.microsoft.com/office/drawing/2018/hyperlinkcolor">
       <p:transition spd="slow">
         <p:fade/>
       </p:transition>
@@ -8786,7 +8786,7 @@
         <p:fade/>
       </p:transition>
     </mc:Choice>
-    <mc:Fallback xmlns:ahyp="http://schemas.microsoft.com/office/drawing/2018/hyperlinkcolor" xmlns:p15="http://schemas.microsoft.com/office/powerpoint/2012/main" xmlns:com="http://schemas.openxmlformats.org/drawingml/2006/compatibility" xmlns:pvml="urn:schemas-microsoft-com:office:powerpoint" xmlns:v="urn:schemas-microsoft-com:vml" xmlns:o="urn:schemas-microsoft-com:office:office" xmlns:dgm="http://schemas.openxmlformats.org/drawingml/2006/diagram" xmlns:c="http://schemas.openxmlformats.org/drawingml/2006/chart" xmlns:mv="urn:schemas-microsoft-com:mac:vml" xmlns="">
+    <mc:Fallback xmlns="" xmlns:mv="urn:schemas-microsoft-com:mac:vml" xmlns:c="http://schemas.openxmlformats.org/drawingml/2006/chart" xmlns:dgm="http://schemas.openxmlformats.org/drawingml/2006/diagram" xmlns:o="urn:schemas-microsoft-com:office:office" xmlns:v="urn:schemas-microsoft-com:vml" xmlns:pvml="urn:schemas-microsoft-com:office:powerpoint" xmlns:com="http://schemas.openxmlformats.org/drawingml/2006/compatibility" xmlns:p15="http://schemas.microsoft.com/office/powerpoint/2012/main" xmlns:ahyp="http://schemas.microsoft.com/office/drawing/2018/hyperlinkcolor">
       <p:transition spd="slow">
         <p:fade/>
       </p:transition>

</xml_diff>

<commit_message>
change belt exam date
</commit_message>
<xml_diff>
--- a/Week 11 Day 1  Neural Networks.pptx
+++ b/Week 11 Day 1  Neural Networks.pptx
@@ -4649,7 +4649,7 @@
         </p:nvSpPr>
         <p:spPr>
           <a:xfrm>
-            <a:off x="381300" y="685800"/>
+            <a:off x="381000" y="685800"/>
             <a:ext cx="6096000" cy="3429000"/>
           </a:xfrm>
           <a:custGeom>
@@ -6213,7 +6213,7 @@
         <p:fade/>
       </p:transition>
     </mc:Choice>
-    <mc:Fallback xmlns:ahyp="http://schemas.microsoft.com/office/drawing/2018/hyperlinkcolor" xmlns:p15="http://schemas.microsoft.com/office/powerpoint/2012/main" xmlns:com="http://schemas.openxmlformats.org/drawingml/2006/compatibility" xmlns:pvml="urn:schemas-microsoft-com:office:powerpoint" xmlns:v="urn:schemas-microsoft-com:vml" xmlns:o="urn:schemas-microsoft-com:office:office" xmlns:dgm="http://schemas.openxmlformats.org/drawingml/2006/diagram" xmlns:c="http://schemas.openxmlformats.org/drawingml/2006/chart" xmlns:mv="urn:schemas-microsoft-com:mac:vml" xmlns="">
+    <mc:Fallback xmlns="" xmlns:mv="urn:schemas-microsoft-com:mac:vml" xmlns:c="http://schemas.openxmlformats.org/drawingml/2006/chart" xmlns:dgm="http://schemas.openxmlformats.org/drawingml/2006/diagram" xmlns:o="urn:schemas-microsoft-com:office:office" xmlns:v="urn:schemas-microsoft-com:vml" xmlns:pvml="urn:schemas-microsoft-com:office:powerpoint" xmlns:com="http://schemas.openxmlformats.org/drawingml/2006/compatibility" xmlns:p15="http://schemas.microsoft.com/office/powerpoint/2012/main" xmlns:ahyp="http://schemas.microsoft.com/office/drawing/2018/hyperlinkcolor">
       <p:transition spd="slow">
         <p:fade/>
       </p:transition>
@@ -6250,7 +6250,7 @@
         <p:fade/>
       </p:transition>
     </mc:Choice>
-    <mc:Fallback xmlns:ahyp="http://schemas.microsoft.com/office/drawing/2018/hyperlinkcolor" xmlns:p15="http://schemas.microsoft.com/office/powerpoint/2012/main" xmlns:com="http://schemas.openxmlformats.org/drawingml/2006/compatibility" xmlns:pvml="urn:schemas-microsoft-com:office:powerpoint" xmlns:v="urn:schemas-microsoft-com:vml" xmlns:o="urn:schemas-microsoft-com:office:office" xmlns:dgm="http://schemas.openxmlformats.org/drawingml/2006/diagram" xmlns:c="http://schemas.openxmlformats.org/drawingml/2006/chart" xmlns:mv="urn:schemas-microsoft-com:mac:vml" xmlns="">
+    <mc:Fallback xmlns="" xmlns:mv="urn:schemas-microsoft-com:mac:vml" xmlns:c="http://schemas.openxmlformats.org/drawingml/2006/chart" xmlns:dgm="http://schemas.openxmlformats.org/drawingml/2006/diagram" xmlns:o="urn:schemas-microsoft-com:office:office" xmlns:v="urn:schemas-microsoft-com:vml" xmlns:pvml="urn:schemas-microsoft-com:office:powerpoint" xmlns:com="http://schemas.openxmlformats.org/drawingml/2006/compatibility" xmlns:p15="http://schemas.microsoft.com/office/powerpoint/2012/main" xmlns:ahyp="http://schemas.microsoft.com/office/drawing/2018/hyperlinkcolor">
       <p:transition spd="slow">
         <p:fade/>
       </p:transition>
@@ -6287,7 +6287,7 @@
         <p:fade/>
       </p:transition>
     </mc:Choice>
-    <mc:Fallback xmlns:ahyp="http://schemas.microsoft.com/office/drawing/2018/hyperlinkcolor" xmlns:p15="http://schemas.microsoft.com/office/powerpoint/2012/main" xmlns:com="http://schemas.openxmlformats.org/drawingml/2006/compatibility" xmlns:pvml="urn:schemas-microsoft-com:office:powerpoint" xmlns:v="urn:schemas-microsoft-com:vml" xmlns:o="urn:schemas-microsoft-com:office:office" xmlns:dgm="http://schemas.openxmlformats.org/drawingml/2006/diagram" xmlns:c="http://schemas.openxmlformats.org/drawingml/2006/chart" xmlns:mv="urn:schemas-microsoft-com:mac:vml" xmlns="">
+    <mc:Fallback xmlns="" xmlns:mv="urn:schemas-microsoft-com:mac:vml" xmlns:c="http://schemas.openxmlformats.org/drawingml/2006/chart" xmlns:dgm="http://schemas.openxmlformats.org/drawingml/2006/diagram" xmlns:o="urn:schemas-microsoft-com:office:office" xmlns:v="urn:schemas-microsoft-com:vml" xmlns:pvml="urn:schemas-microsoft-com:office:powerpoint" xmlns:com="http://schemas.openxmlformats.org/drawingml/2006/compatibility" xmlns:p15="http://schemas.microsoft.com/office/powerpoint/2012/main" xmlns:ahyp="http://schemas.microsoft.com/office/drawing/2018/hyperlinkcolor">
       <p:transition spd="slow">
         <p:fade/>
       </p:transition>
@@ -6324,7 +6324,7 @@
         <p:fade/>
       </p:transition>
     </mc:Choice>
-    <mc:Fallback xmlns:ahyp="http://schemas.microsoft.com/office/drawing/2018/hyperlinkcolor" xmlns:p15="http://schemas.microsoft.com/office/powerpoint/2012/main" xmlns:com="http://schemas.openxmlformats.org/drawingml/2006/compatibility" xmlns:pvml="urn:schemas-microsoft-com:office:powerpoint" xmlns:v="urn:schemas-microsoft-com:vml" xmlns:o="urn:schemas-microsoft-com:office:office" xmlns:dgm="http://schemas.openxmlformats.org/drawingml/2006/diagram" xmlns:c="http://schemas.openxmlformats.org/drawingml/2006/chart" xmlns:mv="urn:schemas-microsoft-com:mac:vml" xmlns="">
+    <mc:Fallback xmlns="" xmlns:mv="urn:schemas-microsoft-com:mac:vml" xmlns:c="http://schemas.openxmlformats.org/drawingml/2006/chart" xmlns:dgm="http://schemas.openxmlformats.org/drawingml/2006/diagram" xmlns:o="urn:schemas-microsoft-com:office:office" xmlns:v="urn:schemas-microsoft-com:vml" xmlns:pvml="urn:schemas-microsoft-com:office:powerpoint" xmlns:com="http://schemas.openxmlformats.org/drawingml/2006/compatibility" xmlns:p15="http://schemas.microsoft.com/office/powerpoint/2012/main" xmlns:ahyp="http://schemas.microsoft.com/office/drawing/2018/hyperlinkcolor">
       <p:transition spd="slow">
         <p:fade/>
       </p:transition>
@@ -7861,7 +7861,7 @@
         <p:fade/>
       </p:transition>
     </mc:Choice>
-    <mc:Fallback xmlns:ahyp="http://schemas.microsoft.com/office/drawing/2018/hyperlinkcolor" xmlns:p15="http://schemas.microsoft.com/office/powerpoint/2012/main" xmlns:com="http://schemas.openxmlformats.org/drawingml/2006/compatibility" xmlns:pvml="urn:schemas-microsoft-com:office:powerpoint" xmlns:v="urn:schemas-microsoft-com:vml" xmlns:o="urn:schemas-microsoft-com:office:office" xmlns:dgm="http://schemas.openxmlformats.org/drawingml/2006/diagram" xmlns:c="http://schemas.openxmlformats.org/drawingml/2006/chart" xmlns:mv="urn:schemas-microsoft-com:mac:vml" xmlns="">
+    <mc:Fallback xmlns="" xmlns:mv="urn:schemas-microsoft-com:mac:vml" xmlns:c="http://schemas.openxmlformats.org/drawingml/2006/chart" xmlns:dgm="http://schemas.openxmlformats.org/drawingml/2006/diagram" xmlns:o="urn:schemas-microsoft-com:office:office" xmlns:v="urn:schemas-microsoft-com:vml" xmlns:pvml="urn:schemas-microsoft-com:office:powerpoint" xmlns:com="http://schemas.openxmlformats.org/drawingml/2006/compatibility" xmlns:p15="http://schemas.microsoft.com/office/powerpoint/2012/main" xmlns:ahyp="http://schemas.microsoft.com/office/drawing/2018/hyperlinkcolor">
       <p:transition spd="slow">
         <p:fade/>
       </p:transition>
@@ -7898,7 +7898,7 @@
         <p:fade/>
       </p:transition>
     </mc:Choice>
-    <mc:Fallback xmlns:ahyp="http://schemas.microsoft.com/office/drawing/2018/hyperlinkcolor" xmlns:p15="http://schemas.microsoft.com/office/powerpoint/2012/main" xmlns:com="http://schemas.openxmlformats.org/drawingml/2006/compatibility" xmlns:pvml="urn:schemas-microsoft-com:office:powerpoint" xmlns:v="urn:schemas-microsoft-com:vml" xmlns:o="urn:schemas-microsoft-com:office:office" xmlns:dgm="http://schemas.openxmlformats.org/drawingml/2006/diagram" xmlns:c="http://schemas.openxmlformats.org/drawingml/2006/chart" xmlns:mv="urn:schemas-microsoft-com:mac:vml" xmlns="">
+    <mc:Fallback xmlns="" xmlns:mv="urn:schemas-microsoft-com:mac:vml" xmlns:c="http://schemas.openxmlformats.org/drawingml/2006/chart" xmlns:dgm="http://schemas.openxmlformats.org/drawingml/2006/diagram" xmlns:o="urn:schemas-microsoft-com:office:office" xmlns:v="urn:schemas-microsoft-com:vml" xmlns:pvml="urn:schemas-microsoft-com:office:powerpoint" xmlns:com="http://schemas.openxmlformats.org/drawingml/2006/compatibility" xmlns:p15="http://schemas.microsoft.com/office/powerpoint/2012/main" xmlns:ahyp="http://schemas.microsoft.com/office/drawing/2018/hyperlinkcolor">
       <p:transition spd="slow">
         <p:fade/>
       </p:transition>
@@ -7935,7 +7935,7 @@
         <p:fade/>
       </p:transition>
     </mc:Choice>
-    <mc:Fallback xmlns:ahyp="http://schemas.microsoft.com/office/drawing/2018/hyperlinkcolor" xmlns:p15="http://schemas.microsoft.com/office/powerpoint/2012/main" xmlns:com="http://schemas.openxmlformats.org/drawingml/2006/compatibility" xmlns:pvml="urn:schemas-microsoft-com:office:powerpoint" xmlns:v="urn:schemas-microsoft-com:vml" xmlns:o="urn:schemas-microsoft-com:office:office" xmlns:dgm="http://schemas.openxmlformats.org/drawingml/2006/diagram" xmlns:c="http://schemas.openxmlformats.org/drawingml/2006/chart" xmlns:mv="urn:schemas-microsoft-com:mac:vml" xmlns="">
+    <mc:Fallback xmlns="" xmlns:mv="urn:schemas-microsoft-com:mac:vml" xmlns:c="http://schemas.openxmlformats.org/drawingml/2006/chart" xmlns:dgm="http://schemas.openxmlformats.org/drawingml/2006/diagram" xmlns:o="urn:schemas-microsoft-com:office:office" xmlns:v="urn:schemas-microsoft-com:vml" xmlns:pvml="urn:schemas-microsoft-com:office:powerpoint" xmlns:com="http://schemas.openxmlformats.org/drawingml/2006/compatibility" xmlns:p15="http://schemas.microsoft.com/office/powerpoint/2012/main" xmlns:ahyp="http://schemas.microsoft.com/office/drawing/2018/hyperlinkcolor">
       <p:transition spd="slow">
         <p:fade/>
       </p:transition>
@@ -7972,7 +7972,7 @@
         <p:fade/>
       </p:transition>
     </mc:Choice>
-    <mc:Fallback xmlns:ahyp="http://schemas.microsoft.com/office/drawing/2018/hyperlinkcolor" xmlns:p15="http://schemas.microsoft.com/office/powerpoint/2012/main" xmlns:com="http://schemas.openxmlformats.org/drawingml/2006/compatibility" xmlns:pvml="urn:schemas-microsoft-com:office:powerpoint" xmlns:v="urn:schemas-microsoft-com:vml" xmlns:o="urn:schemas-microsoft-com:office:office" xmlns:dgm="http://schemas.openxmlformats.org/drawingml/2006/diagram" xmlns:c="http://schemas.openxmlformats.org/drawingml/2006/chart" xmlns:mv="urn:schemas-microsoft-com:mac:vml" xmlns="">
+    <mc:Fallback xmlns="" xmlns:mv="urn:schemas-microsoft-com:mac:vml" xmlns:c="http://schemas.openxmlformats.org/drawingml/2006/chart" xmlns:dgm="http://schemas.openxmlformats.org/drawingml/2006/diagram" xmlns:o="urn:schemas-microsoft-com:office:office" xmlns:v="urn:schemas-microsoft-com:vml" xmlns:pvml="urn:schemas-microsoft-com:office:powerpoint" xmlns:com="http://schemas.openxmlformats.org/drawingml/2006/compatibility" xmlns:p15="http://schemas.microsoft.com/office/powerpoint/2012/main" xmlns:ahyp="http://schemas.microsoft.com/office/drawing/2018/hyperlinkcolor">
       <p:transition spd="slow">
         <p:fade/>
       </p:transition>
@@ -8009,7 +8009,7 @@
         <p:fade/>
       </p:transition>
     </mc:Choice>
-    <mc:Fallback xmlns:ahyp="http://schemas.microsoft.com/office/drawing/2018/hyperlinkcolor" xmlns:p15="http://schemas.microsoft.com/office/powerpoint/2012/main" xmlns:com="http://schemas.openxmlformats.org/drawingml/2006/compatibility" xmlns:pvml="urn:schemas-microsoft-com:office:powerpoint" xmlns:v="urn:schemas-microsoft-com:vml" xmlns:o="urn:schemas-microsoft-com:office:office" xmlns:dgm="http://schemas.openxmlformats.org/drawingml/2006/diagram" xmlns:c="http://schemas.openxmlformats.org/drawingml/2006/chart" xmlns:mv="urn:schemas-microsoft-com:mac:vml" xmlns="">
+    <mc:Fallback xmlns="" xmlns:mv="urn:schemas-microsoft-com:mac:vml" xmlns:c="http://schemas.openxmlformats.org/drawingml/2006/chart" xmlns:dgm="http://schemas.openxmlformats.org/drawingml/2006/diagram" xmlns:o="urn:schemas-microsoft-com:office:office" xmlns:v="urn:schemas-microsoft-com:vml" xmlns:pvml="urn:schemas-microsoft-com:office:powerpoint" xmlns:com="http://schemas.openxmlformats.org/drawingml/2006/compatibility" xmlns:p15="http://schemas.microsoft.com/office/powerpoint/2012/main" xmlns:ahyp="http://schemas.microsoft.com/office/drawing/2018/hyperlinkcolor">
       <p:transition spd="slow">
         <p:fade/>
       </p:transition>
@@ -8046,7 +8046,7 @@
         <p:fade/>
       </p:transition>
     </mc:Choice>
-    <mc:Fallback xmlns:ahyp="http://schemas.microsoft.com/office/drawing/2018/hyperlinkcolor" xmlns:p15="http://schemas.microsoft.com/office/powerpoint/2012/main" xmlns:com="http://schemas.openxmlformats.org/drawingml/2006/compatibility" xmlns:pvml="urn:schemas-microsoft-com:office:powerpoint" xmlns:v="urn:schemas-microsoft-com:vml" xmlns:o="urn:schemas-microsoft-com:office:office" xmlns:dgm="http://schemas.openxmlformats.org/drawingml/2006/diagram" xmlns:c="http://schemas.openxmlformats.org/drawingml/2006/chart" xmlns:mv="urn:schemas-microsoft-com:mac:vml" xmlns="">
+    <mc:Fallback xmlns="" xmlns:mv="urn:schemas-microsoft-com:mac:vml" xmlns:c="http://schemas.openxmlformats.org/drawingml/2006/chart" xmlns:dgm="http://schemas.openxmlformats.org/drawingml/2006/diagram" xmlns:o="urn:schemas-microsoft-com:office:office" xmlns:v="urn:schemas-microsoft-com:vml" xmlns:pvml="urn:schemas-microsoft-com:office:powerpoint" xmlns:com="http://schemas.openxmlformats.org/drawingml/2006/compatibility" xmlns:p15="http://schemas.microsoft.com/office/powerpoint/2012/main" xmlns:ahyp="http://schemas.microsoft.com/office/drawing/2018/hyperlinkcolor">
       <p:transition spd="slow">
         <p:fade/>
       </p:transition>
@@ -8083,7 +8083,7 @@
         <p:fade/>
       </p:transition>
     </mc:Choice>
-    <mc:Fallback xmlns:ahyp="http://schemas.microsoft.com/office/drawing/2018/hyperlinkcolor" xmlns:p15="http://schemas.microsoft.com/office/powerpoint/2012/main" xmlns:com="http://schemas.openxmlformats.org/drawingml/2006/compatibility" xmlns:pvml="urn:schemas-microsoft-com:office:powerpoint" xmlns:v="urn:schemas-microsoft-com:vml" xmlns:o="urn:schemas-microsoft-com:office:office" xmlns:dgm="http://schemas.openxmlformats.org/drawingml/2006/diagram" xmlns:c="http://schemas.openxmlformats.org/drawingml/2006/chart" xmlns:mv="urn:schemas-microsoft-com:mac:vml" xmlns="">
+    <mc:Fallback xmlns="" xmlns:mv="urn:schemas-microsoft-com:mac:vml" xmlns:c="http://schemas.openxmlformats.org/drawingml/2006/chart" xmlns:dgm="http://schemas.openxmlformats.org/drawingml/2006/diagram" xmlns:o="urn:schemas-microsoft-com:office:office" xmlns:v="urn:schemas-microsoft-com:vml" xmlns:pvml="urn:schemas-microsoft-com:office:powerpoint" xmlns:com="http://schemas.openxmlformats.org/drawingml/2006/compatibility" xmlns:p15="http://schemas.microsoft.com/office/powerpoint/2012/main" xmlns:ahyp="http://schemas.microsoft.com/office/drawing/2018/hyperlinkcolor">
       <p:transition spd="slow">
         <p:fade/>
       </p:transition>
@@ -8681,7 +8681,7 @@
         <p:fade/>
       </p:transition>
     </mc:Choice>
-    <mc:Fallback xmlns:ahyp="http://schemas.microsoft.com/office/drawing/2018/hyperlinkcolor" xmlns:p15="http://schemas.microsoft.com/office/powerpoint/2012/main" xmlns:com="http://schemas.openxmlformats.org/drawingml/2006/compatibility" xmlns:pvml="urn:schemas-microsoft-com:office:powerpoint" xmlns:v="urn:schemas-microsoft-com:vml" xmlns:o="urn:schemas-microsoft-com:office:office" xmlns:dgm="http://schemas.openxmlformats.org/drawingml/2006/diagram" xmlns:c="http://schemas.openxmlformats.org/drawingml/2006/chart" xmlns:mv="urn:schemas-microsoft-com:mac:vml" xmlns="">
+    <mc:Fallback xmlns="" xmlns:mv="urn:schemas-microsoft-com:mac:vml" xmlns:c="http://schemas.openxmlformats.org/drawingml/2006/chart" xmlns:dgm="http://schemas.openxmlformats.org/drawingml/2006/diagram" xmlns:o="urn:schemas-microsoft-com:office:office" xmlns:v="urn:schemas-microsoft-com:vml" xmlns:pvml="urn:schemas-microsoft-com:office:powerpoint" xmlns:com="http://schemas.openxmlformats.org/drawingml/2006/compatibility" xmlns:p15="http://schemas.microsoft.com/office/powerpoint/2012/main" xmlns:ahyp="http://schemas.microsoft.com/office/drawing/2018/hyperlinkcolor">
       <p:transition spd="slow">
         <p:fade/>
       </p:transition>
@@ -10092,7 +10092,7 @@
               <a:buNone/>
             </a:pPr>
             <a:r>
-              <a:rPr lang="en" sz="1500" b="1" i="0" u="none" strike="noStrike" cap="none">
+              <a:rPr lang="en" sz="1500" b="1" i="0" u="none" strike="noStrike" cap="none" dirty="0">
                 <a:solidFill>
                   <a:srgbClr val="292929"/>
                 </a:solidFill>
@@ -10106,7 +10106,7 @@
               </a:rPr>
               <a:t>Does this formula look familiar?</a:t>
             </a:r>
-            <a:endParaRPr sz="1500" b="1" i="0" u="none" strike="noStrike" cap="none">
+            <a:endParaRPr sz="1500" b="1" i="0" u="none" strike="noStrike" cap="none" dirty="0">
               <a:solidFill>
                 <a:srgbClr val="292929"/>
               </a:solidFill>
@@ -10137,7 +10137,7 @@
               <a:buFont typeface="Arial"/>
               <a:buNone/>
             </a:pPr>
-            <a:endParaRPr sz="1500" b="1" i="0" u="none" strike="noStrike" cap="none">
+            <a:endParaRPr sz="1500" b="1" i="0" u="none" strike="noStrike" cap="none" dirty="0">
               <a:solidFill>
                 <a:srgbClr val="292929"/>
               </a:solidFill>
@@ -10168,7 +10168,7 @@
               <a:buFont typeface="Arial"/>
               <a:buNone/>
             </a:pPr>
-            <a:endParaRPr sz="1500" b="1" i="0" u="none" strike="noStrike" cap="none">
+            <a:endParaRPr sz="1500" b="1" i="0" u="none" strike="noStrike" cap="none" dirty="0">
               <a:solidFill>
                 <a:srgbClr val="292929"/>
               </a:solidFill>
@@ -10200,7 +10200,7 @@
               <a:buNone/>
             </a:pPr>
             <a:r>
-              <a:rPr lang="en" sz="2000" b="1" i="0" u="none" strike="noStrike" cap="none">
+              <a:rPr lang="en" sz="2000" b="1" i="0" u="none" strike="noStrike" cap="none" dirty="0">
                 <a:solidFill>
                   <a:srgbClr val="292929"/>
                 </a:solidFill>
@@ -10215,7 +10215,7 @@
               <a:t>y_pred = Σ(</a:t>
             </a:r>
             <a:r>
-              <a:rPr lang="en" sz="2000" b="0" i="0" u="none" strike="noStrike" cap="none">
+              <a:rPr lang="en" sz="2000" b="0" i="0" u="none" strike="noStrike" cap="none" dirty="0">
                 <a:solidFill>
                   <a:srgbClr val="292929"/>
                 </a:solidFill>
@@ -10230,7 +10230,7 @@
               <a:t>x</a:t>
             </a:r>
             <a:r>
-              <a:rPr lang="en" sz="2000" b="0" i="0" u="none" strike="noStrike" cap="none" baseline="-25000">
+              <a:rPr lang="en" sz="2000" b="0" i="0" u="none" strike="noStrike" cap="none" baseline="-25000" dirty="0">
                 <a:solidFill>
                   <a:srgbClr val="292929"/>
                 </a:solidFill>
@@ -10245,7 +10245,7 @@
               <a:t>i</a:t>
             </a:r>
             <a:r>
-              <a:rPr lang="en" sz="2000" b="0" i="0" u="none" strike="noStrike" cap="none">
+              <a:rPr lang="en" sz="2000" b="0" i="0" u="none" strike="noStrike" cap="none" dirty="0">
                 <a:solidFill>
                   <a:srgbClr val="292929"/>
                 </a:solidFill>
@@ -10260,7 +10260,7 @@
               <a:t>*w</a:t>
             </a:r>
             <a:r>
-              <a:rPr lang="en" sz="2000" b="0" i="0" u="none" strike="noStrike" cap="none" baseline="-25000">
+              <a:rPr lang="en" sz="2000" b="0" i="0" u="none" strike="noStrike" cap="none" baseline="-25000" dirty="0">
                 <a:solidFill>
                   <a:srgbClr val="292929"/>
                 </a:solidFill>
@@ -10275,7 +10275,7 @@
               <a:t>i</a:t>
             </a:r>
             <a:r>
-              <a:rPr lang="en" sz="2000" b="1" i="0" u="none" strike="noStrike" cap="none">
+              <a:rPr lang="en" sz="2000" b="1" i="0" u="none" strike="noStrike" cap="none" dirty="0">
                 <a:solidFill>
                   <a:srgbClr val="292929"/>
                 </a:solidFill>
@@ -10290,7 +10290,7 @@
               <a:t>) + </a:t>
             </a:r>
             <a:r>
-              <a:rPr lang="en" sz="2000" b="0" i="0" u="none" strike="noStrike" cap="none">
+              <a:rPr lang="en" sz="2000" b="0" i="0" u="none" strike="noStrike" cap="none" dirty="0">
                 <a:solidFill>
                   <a:srgbClr val="292929"/>
                 </a:solidFill>
@@ -10304,7 +10304,7 @@
               </a:rPr>
               <a:t>bias</a:t>
             </a:r>
-            <a:endParaRPr sz="2000" b="0" i="0" u="none" strike="noStrike" cap="none">
+            <a:endParaRPr sz="2000" b="0" i="0" u="none" strike="noStrike" cap="none" dirty="0">
               <a:solidFill>
                 <a:srgbClr val="292929"/>
               </a:solidFill>
@@ -10335,7 +10335,7 @@
               <a:buFont typeface="Arial"/>
               <a:buNone/>
             </a:pPr>
-            <a:endParaRPr sz="1500" b="0" i="0" u="none" strike="noStrike" cap="none">
+            <a:endParaRPr sz="1500" b="0" i="0" u="none" strike="noStrike" cap="none" dirty="0">
               <a:solidFill>
                 <a:srgbClr val="292929"/>
               </a:solidFill>
@@ -10367,7 +10367,7 @@
               <a:buNone/>
             </a:pPr>
             <a:r>
-              <a:rPr lang="en" sz="1500" b="0" i="0" u="none" strike="noStrike" cap="none">
+              <a:rPr lang="en" sz="1500" b="0" i="0" u="none" strike="noStrike" cap="none" dirty="0">
                 <a:solidFill>
                   <a:srgbClr val="292929"/>
                 </a:solidFill>
@@ -10381,7 +10381,7 @@
               </a:rPr>
               <a:t>translation:</a:t>
             </a:r>
-            <a:endParaRPr sz="1500" b="0" i="0" u="none" strike="noStrike" cap="none">
+            <a:endParaRPr sz="1500" b="0" i="0" u="none" strike="noStrike" cap="none" dirty="0">
               <a:solidFill>
                 <a:srgbClr val="292929"/>
               </a:solidFill>
@@ -10412,7 +10412,7 @@
               <a:buFont typeface="Arial"/>
               <a:buNone/>
             </a:pPr>
-            <a:endParaRPr sz="1500" b="0" i="1" u="none" strike="noStrike" cap="none">
+            <a:endParaRPr sz="1500" b="0" i="1" u="none" strike="noStrike" cap="none" dirty="0">
               <a:solidFill>
                 <a:srgbClr val="292929"/>
               </a:solidFill>
@@ -10444,7 +10444,7 @@
               <a:buNone/>
             </a:pPr>
             <a:r>
-              <a:rPr lang="en" sz="1500" b="0" i="0" u="none" strike="noStrike" cap="none">
+              <a:rPr lang="en" sz="1500" b="0" i="0" u="none" strike="noStrike" cap="none" dirty="0">
                 <a:solidFill>
                   <a:srgbClr val="292929"/>
                 </a:solidFill>
@@ -10458,7 +10458,7 @@
               </a:rPr>
               <a:t>prediction = sum of weights times features, plus intercept (bias term)</a:t>
             </a:r>
-            <a:endParaRPr sz="1500">
+            <a:endParaRPr sz="1500" dirty="0">
               <a:solidFill>
                 <a:srgbClr val="292929"/>
               </a:solidFill>
@@ -37914,7 +37914,7 @@
               <a:buFont typeface="Arial"/>
               <a:buNone/>
             </a:pPr>
-            <a:endParaRPr sz="1400" b="0" i="0" u="none" strike="noStrike" cap="none">
+            <a:endParaRPr sz="1400" b="0" i="0" u="none" strike="noStrike" cap="none" dirty="0">
               <a:solidFill>
                 <a:srgbClr val="000000"/>
               </a:solidFill>
@@ -37943,7 +37943,7 @@
               <a:buChar char="●"/>
             </a:pPr>
             <a:r>
-              <a:rPr lang="en" sz="1400" b="0" i="0" u="none" strike="noStrike" cap="none">
+              <a:rPr lang="en" sz="1400" b="0" i="0" u="none" strike="noStrike" cap="none" dirty="0">
                 <a:solidFill>
                   <a:srgbClr val="000000"/>
                 </a:solidFill>
@@ -37955,7 +37955,7 @@
               <a:t>Activation functions are applied to the output of each node before it is passed to the next layer.</a:t>
             </a:r>
             <a:br>
-              <a:rPr lang="en" sz="1400" b="0" i="0" u="none" strike="noStrike" cap="none">
+              <a:rPr lang="en" sz="1400" b="0" i="0" u="none" strike="noStrike" cap="none" dirty="0">
                 <a:solidFill>
                   <a:srgbClr val="000000"/>
                 </a:solidFill>
@@ -37965,7 +37965,7 @@
                 <a:sym typeface="Arial"/>
               </a:rPr>
             </a:br>
-            <a:endParaRPr sz="1400" b="0" i="0" u="none" strike="noStrike" cap="none">
+            <a:endParaRPr sz="1400" b="0" i="0" u="none" strike="noStrike" cap="none" dirty="0">
               <a:solidFill>
                 <a:srgbClr val="000000"/>
               </a:solidFill>
@@ -37994,7 +37994,7 @@
               <a:buChar char="●"/>
             </a:pPr>
             <a:r>
-              <a:rPr lang="en" sz="1400" b="0" i="0" u="none" strike="noStrike" cap="none">
+              <a:rPr lang="en" sz="1400" b="0" i="0" u="none" strike="noStrike" cap="none" dirty="0">
                 <a:solidFill>
                   <a:srgbClr val="000000"/>
                 </a:solidFill>
@@ -38005,7 +38005,7 @@
               </a:rPr>
               <a:t>These allow a neural network to find non-linear relationships between features and targets</a:t>
             </a:r>
-            <a:endParaRPr sz="1400" b="0" i="0" u="none" strike="noStrike" cap="none">
+            <a:endParaRPr sz="1400" b="0" i="0" u="none" strike="noStrike" cap="none" dirty="0">
               <a:solidFill>
                 <a:srgbClr val="000000"/>
               </a:solidFill>
@@ -38033,7 +38033,7 @@
               <a:buFont typeface="Arial"/>
               <a:buNone/>
             </a:pPr>
-            <a:endParaRPr sz="1400" b="0" i="0" u="none" strike="noStrike" cap="none">
+            <a:endParaRPr sz="1400" b="0" i="0" u="none" strike="noStrike" cap="none" dirty="0">
               <a:solidFill>
                 <a:srgbClr val="000000"/>
               </a:solidFill>
@@ -38062,7 +38062,7 @@
               <a:buChar char="●"/>
             </a:pPr>
             <a:r>
-              <a:rPr lang="en" sz="1400" b="0" i="0" u="none" strike="noStrike" cap="none">
+              <a:rPr lang="en" sz="1400" b="0" i="0" u="none" strike="noStrike" cap="none" dirty="0">
                 <a:solidFill>
                   <a:srgbClr val="000000"/>
                 </a:solidFill>
@@ -38074,7 +38074,7 @@
               <a:t>The activation function can also limit the range of final outputs to match the problem type.</a:t>
             </a:r>
             <a:br>
-              <a:rPr lang="en" sz="1400" b="0" i="0" u="none" strike="noStrike" cap="none">
+              <a:rPr lang="en" sz="1400" b="0" i="0" u="none" strike="noStrike" cap="none" dirty="0">
                 <a:solidFill>
                   <a:srgbClr val="000000"/>
                 </a:solidFill>
@@ -38084,7 +38084,7 @@
                 <a:sym typeface="Arial"/>
               </a:rPr>
             </a:br>
-            <a:endParaRPr sz="1400" b="0" i="0" u="none" strike="noStrike" cap="none">
+            <a:endParaRPr sz="1400" b="0" i="0" u="none" strike="noStrike" cap="none" dirty="0">
               <a:solidFill>
                 <a:srgbClr val="000000"/>
               </a:solidFill>
@@ -38112,7 +38112,7 @@
               <a:buFont typeface="Arial"/>
               <a:buNone/>
             </a:pPr>
-            <a:endParaRPr sz="1400" b="0" i="0" u="none" strike="noStrike" cap="none">
+            <a:endParaRPr sz="1400" b="0" i="0" u="none" strike="noStrike" cap="none" dirty="0">
               <a:solidFill>
                 <a:srgbClr val="000000"/>
               </a:solidFill>
@@ -39052,7 +39052,7 @@
               <a:buNone/>
             </a:pPr>
             <a:r>
-              <a:rPr lang="en" sz="1400" b="0" i="0" u="none" strike="noStrike" cap="none">
+              <a:rPr lang="en" sz="1400" b="0" i="0" u="none" strike="noStrike" cap="none" dirty="0">
                 <a:solidFill>
                   <a:srgbClr val="000000"/>
                 </a:solidFill>
@@ -39064,11 +39064,11 @@
               <a:t>Pred</a:t>
             </a:r>
             <a:r>
-              <a:rPr lang="en"/>
+              <a:rPr lang="en" dirty="0"/>
               <a:t>iction:</a:t>
             </a:r>
             <a:r>
-              <a:rPr lang="en" sz="1400" b="0" i="0" u="none" strike="noStrike" cap="none">
+              <a:rPr lang="en" sz="1400" b="0" i="0" u="none" strike="noStrike" cap="none" dirty="0">
                 <a:solidFill>
                   <a:srgbClr val="000000"/>
                 </a:solidFill>
@@ -39079,7 +39079,7 @@
               </a:rPr>
               <a:t> </a:t>
             </a:r>
-            <a:endParaRPr sz="1400" b="0" i="0" u="none" strike="noStrike" cap="none">
+            <a:endParaRPr sz="1400" b="0" i="0" u="none" strike="noStrike" cap="none" dirty="0">
               <a:solidFill>
                 <a:srgbClr val="000000"/>
               </a:solidFill>
@@ -39108,11 +39108,11 @@
               <a:buNone/>
             </a:pPr>
             <a:r>
-              <a:rPr lang="en"/>
+              <a:rPr lang="en" dirty="0"/>
               <a:t>sigmoid</a:t>
             </a:r>
             <a:r>
-              <a:rPr lang="en" sz="1400" b="0" i="0" u="none" strike="noStrike" cap="none">
+              <a:rPr lang="en" sz="1400" b="0" i="0" u="none" strike="noStrike" cap="none" dirty="0">
                 <a:solidFill>
                   <a:srgbClr val="000000"/>
                 </a:solidFill>
@@ -39124,11 +39124,11 @@
               <a:t>(</a:t>
             </a:r>
             <a:r>
-              <a:rPr lang="en"/>
+              <a:rPr lang="en" dirty="0"/>
               <a:t>18</a:t>
             </a:r>
             <a:r>
-              <a:rPr lang="en" sz="1400" b="0" i="0" u="none" strike="noStrike" cap="none">
+              <a:rPr lang="en" sz="1400" b="0" i="0" u="none" strike="noStrike" cap="none" dirty="0">
                 <a:solidFill>
                   <a:srgbClr val="000000"/>
                 </a:solidFill>
@@ -39140,10 +39140,10 @@
               <a:t>)</a:t>
             </a:r>
             <a:r>
-              <a:rPr lang="en"/>
+              <a:rPr lang="en" dirty="0"/>
               <a:t> = .999</a:t>
             </a:r>
-            <a:endParaRPr/>
+            <a:endParaRPr dirty="0"/>
           </a:p>
         </p:txBody>
       </p:sp>
@@ -42604,10 +42604,10 @@
               <a:buNone/>
             </a:pPr>
             <a:r>
-              <a:rPr lang="en"/>
+              <a:rPr lang="en" dirty="0"/>
               <a:t>MSE = 4.47</a:t>
             </a:r>
-            <a:endParaRPr/>
+            <a:endParaRPr dirty="0"/>
           </a:p>
         </p:txBody>
       </p:sp>
@@ -43154,7 +43154,7 @@
               <a:buNone/>
             </a:pPr>
             <a:r>
-              <a:rPr lang="en" sz="1400" b="0" i="0" u="none" strike="noStrike" cap="none">
+              <a:rPr lang="en" sz="1400" b="0" i="0" u="none" strike="noStrike" cap="none" dirty="0">
                 <a:solidFill>
                   <a:srgbClr val="000000"/>
                 </a:solidFill>
@@ -43166,7 +43166,7 @@
               <a:t>Backward propagation is the process </a:t>
             </a:r>
             <a:r>
-              <a:rPr lang="en" sz="1400" b="1" i="0" u="none" strike="noStrike" cap="none">
+              <a:rPr lang="en" sz="1400" b="1" i="0" u="none" strike="noStrike" cap="none" dirty="0">
                 <a:solidFill>
                   <a:srgbClr val="000000"/>
                 </a:solidFill>
@@ -43174,7 +43174,7 @@
               <a:t>changing the weights</a:t>
             </a:r>
             <a:r>
-              <a:rPr lang="en" sz="1400" b="0" i="0" u="none" strike="noStrike" cap="none">
+              <a:rPr lang="en" sz="1400" b="0" i="0" u="none" strike="noStrike" cap="none" dirty="0">
                 <a:solidFill>
                   <a:srgbClr val="000000"/>
                 </a:solidFill>
@@ -43186,7 +43186,7 @@
               <a:t> of the nodes to </a:t>
             </a:r>
             <a:r>
-              <a:rPr lang="en" sz="1400" b="1" i="0" u="none" strike="noStrike" cap="none">
+              <a:rPr lang="en" sz="1400" b="1" i="0" u="none" strike="noStrike" cap="none" dirty="0">
                 <a:solidFill>
                   <a:srgbClr val="000000"/>
                 </a:solidFill>
@@ -43198,7 +43198,7 @@
               <a:t>reduce the </a:t>
             </a:r>
             <a:r>
-              <a:rPr lang="en" sz="1400" b="1" i="1" u="none" strike="noStrike" cap="none">
+              <a:rPr lang="en" sz="1400" b="1" i="1" u="none" strike="noStrike" cap="none" dirty="0">
                 <a:solidFill>
                   <a:srgbClr val="000000"/>
                 </a:solidFill>
@@ -43210,7 +43210,7 @@
               <a:t>Cost</a:t>
             </a:r>
             <a:r>
-              <a:rPr lang="en" sz="1400" b="1" i="0" u="none" strike="noStrike" cap="none">
+              <a:rPr lang="en" sz="1400" b="1" i="0" u="none" strike="noStrike" cap="none" dirty="0">
                 <a:solidFill>
                   <a:srgbClr val="000000"/>
                 </a:solidFill>
@@ -43222,10 +43222,10 @@
               <a:t> </a:t>
             </a:r>
             <a:r>
-              <a:rPr lang="en"/>
+              <a:rPr lang="en" dirty="0"/>
               <a:t>(total error) of the model on the data</a:t>
             </a:r>
-            <a:endParaRPr sz="1400" b="0" i="0" u="none" strike="noStrike" cap="none">
+            <a:endParaRPr sz="1400" b="0" i="0" u="none" strike="noStrike" cap="none" dirty="0">
               <a:solidFill>
                 <a:srgbClr val="000000"/>
               </a:solidFill>
@@ -43253,7 +43253,7 @@
               <a:buFont typeface="Arial"/>
               <a:buNone/>
             </a:pPr>
-            <a:endParaRPr sz="1700" b="0" i="0" u="none" strike="noStrike" cap="none">
+            <a:endParaRPr sz="1700" b="0" i="0" u="none" strike="noStrike" cap="none" dirty="0">
               <a:solidFill>
                 <a:srgbClr val="000000"/>
               </a:solidFill>
@@ -43282,7 +43282,7 @@
               <a:buNone/>
             </a:pPr>
             <a:r>
-              <a:rPr lang="en" sz="1900" b="1" i="0" strike="noStrike" cap="none">
+              <a:rPr lang="en" sz="1900" b="1" i="0" strike="noStrike" cap="none" dirty="0">
                 <a:solidFill>
                   <a:srgbClr val="000000"/>
                 </a:solidFill>
@@ -43293,7 +43293,7 @@
               </a:rPr>
               <a:t>Changing the weights is the process of learning.</a:t>
             </a:r>
-            <a:endParaRPr sz="1700" b="1" i="0" u="none" strike="noStrike" cap="none">
+            <a:endParaRPr sz="1700" b="1" i="0" u="none" strike="noStrike" cap="none" dirty="0">
               <a:solidFill>
                 <a:srgbClr val="000000"/>
               </a:solidFill>
@@ -43570,8 +43570,8 @@
         </p:nvSpPr>
         <p:spPr>
           <a:xfrm>
-            <a:off x="1087303" y="2571749"/>
-            <a:ext cx="7532100" cy="969466"/>
+            <a:off x="945150" y="2302808"/>
+            <a:ext cx="7532100" cy="3062347"/>
           </a:xfrm>
           <a:prstGeom prst="rect">
             <a:avLst/>
@@ -43615,8 +43615,164 @@
             </a:pPr>
             <a:r>
               <a:rPr lang="en" sz="1700" dirty="0"/>
-              <a:t> </a:t>
-            </a:r>
+              <a:t> binning</a:t>
+            </a:r>
+          </a:p>
+          <a:p>
+            <a:pPr marL="457200" lvl="0" indent="-336550" algn="l" rtl="0">
+              <a:spcBef>
+                <a:spcPts val="0"/>
+              </a:spcBef>
+              <a:spcAft>
+                <a:spcPts val="0"/>
+              </a:spcAft>
+              <a:buSzPts val="1700"/>
+              <a:buAutoNum type="arabicPeriod"/>
+            </a:pPr>
+            <a:r>
+              <a:rPr lang="en-US" sz="1700" dirty="0"/>
+              <a:t>C</a:t>
+            </a:r>
+            <a:r>
+              <a:rPr lang="en" sz="1700" dirty="0"/>
+              <a:t>ombine columns</a:t>
+            </a:r>
+          </a:p>
+          <a:p>
+            <a:pPr marL="457200" lvl="0" indent="-336550" algn="l" rtl="0">
+              <a:spcBef>
+                <a:spcPts val="0"/>
+              </a:spcBef>
+              <a:spcAft>
+                <a:spcPts val="0"/>
+              </a:spcAft>
+              <a:buSzPts val="1700"/>
+              <a:buAutoNum type="arabicPeriod"/>
+            </a:pPr>
+            <a:r>
+              <a:rPr lang="en-US" sz="1700" dirty="0"/>
+              <a:t>P</a:t>
+            </a:r>
+            <a:r>
+              <a:rPr lang="en" sz="1700" dirty="0"/>
+              <a:t>ca/ dimensionality reduction.   </a:t>
+            </a:r>
+            <a:r>
+              <a:rPr lang="en-US" sz="1700" dirty="0"/>
+              <a:t>F</a:t>
+            </a:r>
+            <a:r>
+              <a:rPr lang="en" sz="1700" dirty="0"/>
+              <a:t>eature extraction</a:t>
+            </a:r>
+          </a:p>
+          <a:p>
+            <a:pPr marL="457200" lvl="0" indent="-336550" algn="l" rtl="0">
+              <a:spcBef>
+                <a:spcPts val="0"/>
+              </a:spcBef>
+              <a:spcAft>
+                <a:spcPts val="0"/>
+              </a:spcAft>
+              <a:buSzPts val="1700"/>
+              <a:buAutoNum type="arabicPeriod"/>
+            </a:pPr>
+            <a:r>
+              <a:rPr lang="en" sz="1700" dirty="0"/>
+              <a:t>LCA</a:t>
+            </a:r>
+          </a:p>
+          <a:p>
+            <a:pPr marL="457200" lvl="0" indent="-336550" algn="l" rtl="0">
+              <a:spcBef>
+                <a:spcPts val="0"/>
+              </a:spcBef>
+              <a:spcAft>
+                <a:spcPts val="0"/>
+              </a:spcAft>
+              <a:buSzPts val="1700"/>
+              <a:buAutoNum type="arabicPeriod"/>
+            </a:pPr>
+            <a:r>
+              <a:rPr lang="en-US" sz="1700" dirty="0"/>
+              <a:t>L</a:t>
+            </a:r>
+            <a:r>
+              <a:rPr lang="en" sz="1700" dirty="0"/>
+              <a:t>og transforms, other transformation, sqrt, cbrt, square</a:t>
+            </a:r>
+          </a:p>
+          <a:p>
+            <a:pPr marL="457200" lvl="0" indent="-336550" algn="l" rtl="0">
+              <a:spcBef>
+                <a:spcPts val="0"/>
+              </a:spcBef>
+              <a:spcAft>
+                <a:spcPts val="0"/>
+              </a:spcAft>
+              <a:buSzPts val="1700"/>
+              <a:buAutoNum type="arabicPeriod"/>
+            </a:pPr>
+            <a:r>
+              <a:rPr lang="en-US" sz="1700" dirty="0"/>
+              <a:t>F</a:t>
+            </a:r>
+            <a:r>
+              <a:rPr lang="en" sz="1700" dirty="0"/>
+              <a:t>eature selection</a:t>
+            </a:r>
+          </a:p>
+          <a:p>
+            <a:pPr marL="457200" lvl="0" indent="-336550" algn="l" rtl="0">
+              <a:spcBef>
+                <a:spcPts val="0"/>
+              </a:spcBef>
+              <a:spcAft>
+                <a:spcPts val="0"/>
+              </a:spcAft>
+              <a:buSzPts val="1700"/>
+              <a:buAutoNum type="arabicPeriod"/>
+            </a:pPr>
+            <a:r>
+              <a:rPr lang="en-US" sz="1700" dirty="0"/>
+              <a:t>S</a:t>
+            </a:r>
+            <a:r>
+              <a:rPr lang="en" sz="1700" dirty="0"/>
+              <a:t>caling</a:t>
+            </a:r>
+          </a:p>
+          <a:p>
+            <a:pPr marL="457200" lvl="0" indent="-336550" algn="l" rtl="0">
+              <a:spcBef>
+                <a:spcPts val="0"/>
+              </a:spcBef>
+              <a:spcAft>
+                <a:spcPts val="0"/>
+              </a:spcAft>
+              <a:buSzPts val="1700"/>
+              <a:buAutoNum type="arabicPeriod"/>
+            </a:pPr>
+            <a:r>
+              <a:rPr lang="en-US" sz="1700" dirty="0"/>
+              <a:t>E</a:t>
+            </a:r>
+            <a:r>
+              <a:rPr lang="en" sz="1700" dirty="0"/>
+              <a:t>ncoding</a:t>
+            </a:r>
+          </a:p>
+          <a:p>
+            <a:pPr marL="457200" lvl="0" indent="-336550" algn="l" rtl="0">
+              <a:spcBef>
+                <a:spcPts val="0"/>
+              </a:spcBef>
+              <a:spcAft>
+                <a:spcPts val="0"/>
+              </a:spcAft>
+              <a:buSzPts val="1700"/>
+              <a:buAutoNum type="arabicPeriod"/>
+            </a:pPr>
             <a:endParaRPr sz="1700" dirty="0"/>
           </a:p>
           <a:p>
@@ -46800,10 +46956,10 @@
               <a:buChar char="●"/>
             </a:pPr>
             <a:r>
-              <a:rPr lang="en" u="sng"/>
+              <a:rPr lang="en" u="sng" dirty="0"/>
               <a:t>Assignments Due this Week by Friday at 9am PST</a:t>
             </a:r>
-            <a:endParaRPr/>
+            <a:endParaRPr dirty="0"/>
           </a:p>
           <a:p>
             <a:pPr marL="457200" lvl="0" indent="0" algn="l" rtl="0">
@@ -46819,7 +46975,7 @@
               <a:buSzPts val="2000"/>
               <a:buNone/>
             </a:pPr>
-            <a:endParaRPr/>
+            <a:endParaRPr dirty="0"/>
           </a:p>
           <a:p>
             <a:pPr marL="457200" lvl="0" indent="-355600" algn="l" rtl="0">
@@ -46836,10 +46992,10 @@
               <a:buChar char="●"/>
             </a:pPr>
             <a:r>
-              <a:rPr lang="en" u="sng"/>
+              <a:rPr lang="en" u="sng" dirty="0"/>
               <a:t>Belt Exam </a:t>
             </a:r>
-            <a:endParaRPr u="sng"/>
+            <a:endParaRPr u="sng" dirty="0"/>
           </a:p>
           <a:p>
             <a:pPr marL="914400" lvl="1" indent="-355600" algn="l" rtl="0">
@@ -46856,10 +47012,10 @@
               <a:buAutoNum type="alphaLcPeriod"/>
             </a:pPr>
             <a:r>
-              <a:rPr lang="en"/>
+              <a:rPr lang="en" dirty="0"/>
               <a:t>This weekend!  </a:t>
             </a:r>
-            <a:endParaRPr/>
+            <a:endParaRPr dirty="0"/>
           </a:p>
           <a:p>
             <a:pPr marL="1371600" lvl="2" indent="-228600" algn="l" rtl="0">
@@ -46876,10 +47032,18 @@
               <a:buNone/>
             </a:pPr>
             <a:r>
-              <a:rPr lang="en"/>
-              <a:t>December 2nd - 4th</a:t>
-            </a:r>
-            <a:endParaRPr/>
+              <a:rPr lang="en-US" dirty="0"/>
+              <a:t>February 10</a:t>
+            </a:r>
+            <a:r>
+              <a:rPr lang="en-US" baseline="30000" dirty="0"/>
+              <a:t>th</a:t>
+            </a:r>
+            <a:r>
+              <a:rPr lang="en-US" dirty="0"/>
+              <a:t>-12th</a:t>
+            </a:r>
+            <a:endParaRPr dirty="0"/>
           </a:p>
           <a:p>
             <a:pPr marL="1371600" lvl="2" indent="-228600" algn="l" rtl="0">
@@ -46896,10 +47060,10 @@
               <a:buNone/>
             </a:pPr>
             <a:r>
-              <a:rPr lang="en"/>
+              <a:rPr lang="en" dirty="0"/>
               <a:t>Set aside 8-12 hours to complete</a:t>
             </a:r>
-            <a:endParaRPr/>
+            <a:endParaRPr dirty="0"/>
           </a:p>
           <a:p>
             <a:pPr marL="914400" lvl="1" indent="-355600" algn="l" rtl="0">
@@ -46916,10 +47080,10 @@
               <a:buAutoNum type="alphaLcPeriod"/>
             </a:pPr>
             <a:r>
-              <a:rPr lang="en"/>
+              <a:rPr lang="en" dirty="0"/>
               <a:t>Must have attended 80% of classes</a:t>
             </a:r>
-            <a:endParaRPr/>
+            <a:endParaRPr dirty="0"/>
           </a:p>
           <a:p>
             <a:pPr marL="914400" lvl="1" indent="-355600" algn="l" rtl="0">
@@ -46936,10 +47100,10 @@
               <a:buAutoNum type="alphaLcPeriod"/>
             </a:pPr>
             <a:r>
-              <a:rPr lang="en"/>
+              <a:rPr lang="en" dirty="0"/>
               <a:t>Must have submitted: </a:t>
             </a:r>
-            <a:endParaRPr/>
+            <a:endParaRPr dirty="0"/>
           </a:p>
           <a:p>
             <a:pPr marL="914400" lvl="0" indent="0" algn="l" rtl="0">
@@ -46954,7 +47118,7 @@
               </a:spcAft>
               <a:buNone/>
             </a:pPr>
-            <a:endParaRPr/>
+            <a:endParaRPr dirty="0"/>
           </a:p>
           <a:p>
             <a:pPr marL="1371600" lvl="2" indent="-228600" algn="ctr" rtl="0">
@@ -46974,14 +47138,14 @@
               <a:buNone/>
             </a:pPr>
             <a:r>
-              <a:rPr lang="en" b="1">
+              <a:rPr lang="en" b="1" dirty="0">
                 <a:solidFill>
                   <a:srgbClr val="9900FF"/>
                 </a:solidFill>
               </a:rPr>
               <a:t>All assignments from weeks 1 &amp; 2 </a:t>
             </a:r>
-            <a:endParaRPr b="1">
+            <a:endParaRPr b="1" dirty="0">
               <a:solidFill>
                 <a:srgbClr val="9900FF"/>
               </a:solidFill>
@@ -47005,14 +47169,14 @@
               <a:buNone/>
             </a:pPr>
             <a:r>
-              <a:rPr lang="en" b="1">
+              <a:rPr lang="en" b="1" dirty="0">
                 <a:solidFill>
                   <a:srgbClr val="9900FF"/>
                 </a:solidFill>
               </a:rPr>
               <a:t>and all resubmits from week 1.</a:t>
             </a:r>
-            <a:endParaRPr b="1">
+            <a:endParaRPr b="1" dirty="0">
               <a:solidFill>
                 <a:srgbClr val="9900FF"/>
               </a:solidFill>
@@ -47032,7 +47196,7 @@
               <a:buSzPts val="2000"/>
               <a:buNone/>
             </a:pPr>
-            <a:endParaRPr/>
+            <a:endParaRPr dirty="0"/>
           </a:p>
           <a:p>
             <a:pPr marL="457200" lvl="0" indent="0" algn="l" rtl="0">
@@ -47048,7 +47212,7 @@
               <a:buSzPts val="2000"/>
               <a:buNone/>
             </a:pPr>
-            <a:endParaRPr/>
+            <a:endParaRPr dirty="0"/>
           </a:p>
         </p:txBody>
       </p:sp>
@@ -47214,7 +47378,7 @@
               </a:spcAft>
               <a:buNone/>
             </a:pPr>
-            <a:endParaRPr/>
+            <a:endParaRPr dirty="0"/>
           </a:p>
           <a:p>
             <a:pPr marL="457200" lvl="0" indent="-355600" algn="l" rtl="0">
@@ -47231,7 +47395,7 @@
               <a:buAutoNum type="arabicPeriod"/>
             </a:pPr>
             <a:r>
-              <a:rPr lang="en" u="sng">
+              <a:rPr lang="en" u="sng" dirty="0">
                 <a:solidFill>
                   <a:schemeClr val="hlink"/>
                 </a:solidFill>
@@ -47240,10 +47404,10 @@
               <a:t>Neural Network Exercise</a:t>
             </a:r>
             <a:r>
-              <a:rPr lang="en"/>
+              <a:rPr lang="en" dirty="0"/>
               <a:t> - Optional Kaggle Competition</a:t>
             </a:r>
-            <a:endParaRPr/>
+            <a:endParaRPr dirty="0"/>
           </a:p>
           <a:p>
             <a:pPr marL="914400" lvl="1" indent="-355600" algn="l" rtl="0">
@@ -47260,10 +47424,10 @@
               <a:buAutoNum type="alphaLcPeriod"/>
             </a:pPr>
             <a:r>
-              <a:rPr lang="en"/>
+              <a:rPr lang="en" dirty="0"/>
               <a:t>Explain your Model Changes</a:t>
             </a:r>
-            <a:endParaRPr/>
+            <a:endParaRPr dirty="0"/>
           </a:p>
           <a:p>
             <a:pPr marL="914400" lvl="1" indent="-355600" algn="l" rtl="0">
@@ -47283,14 +47447,14 @@
               <a:buAutoNum type="alphaLcPeriod"/>
             </a:pPr>
             <a:r>
-              <a:rPr lang="en">
+              <a:rPr lang="en" dirty="0">
                 <a:solidFill>
                   <a:srgbClr val="9900FF"/>
                 </a:solidFill>
               </a:rPr>
               <a:t>Recommend you submit an entry!</a:t>
             </a:r>
-            <a:endParaRPr>
+            <a:endParaRPr dirty="0">
               <a:solidFill>
                 <a:srgbClr val="9900FF"/>
               </a:solidFill>
@@ -47314,14 +47478,14 @@
               <a:buNone/>
             </a:pPr>
             <a:r>
-              <a:rPr lang="en">
+              <a:rPr lang="en" dirty="0">
                 <a:solidFill>
                   <a:srgbClr val="9900FF"/>
                 </a:solidFill>
               </a:rPr>
               <a:t>Upload a screenshot of your score and rank on Discord!</a:t>
             </a:r>
-            <a:endParaRPr>
+            <a:endParaRPr dirty="0">
               <a:solidFill>
                 <a:srgbClr val="9900FF"/>
               </a:solidFill>
@@ -47342,7 +47506,7 @@
               <a:buAutoNum type="arabicPeriod"/>
             </a:pPr>
             <a:r>
-              <a:rPr lang="en" u="sng">
+              <a:rPr lang="en" u="sng" dirty="0">
                 <a:solidFill>
                   <a:schemeClr val="hlink"/>
                 </a:solidFill>
@@ -47351,10 +47515,10 @@
               <a:t>Project 2 - Part 5</a:t>
             </a:r>
             <a:r>
-              <a:rPr lang="en"/>
+              <a:rPr lang="en" dirty="0"/>
               <a:t> - Presentation slides</a:t>
             </a:r>
-            <a:endParaRPr/>
+            <a:endParaRPr dirty="0"/>
           </a:p>
           <a:p>
             <a:pPr marL="914400" lvl="1" indent="-355600" algn="l" rtl="0">
@@ -47371,18 +47535,18 @@
               <a:buAutoNum type="alphaLcPeriod"/>
             </a:pPr>
             <a:r>
-              <a:rPr lang="en"/>
+              <a:rPr lang="en" dirty="0"/>
               <a:t>Remember: </a:t>
             </a:r>
             <a:r>
-              <a:rPr lang="en">
+              <a:rPr lang="en" dirty="0">
                 <a:highlight>
                   <a:srgbClr val="FFFF00"/>
                 </a:highlight>
               </a:rPr>
               <a:t>NON-DATA SCIENCE AUDIENCE!!!</a:t>
             </a:r>
-            <a:endParaRPr>
+            <a:endParaRPr dirty="0">
               <a:highlight>
                 <a:srgbClr val="FFFF00"/>
               </a:highlight>
@@ -47402,7 +47566,7 @@
               <a:buSzPts val="2000"/>
               <a:buNone/>
             </a:pPr>
-            <a:endParaRPr/>
+            <a:endParaRPr dirty="0"/>
           </a:p>
           <a:p>
             <a:pPr marL="0" lvl="0" indent="0" algn="ctr" rtl="0">
@@ -47419,7 +47583,7 @@
               <a:buNone/>
             </a:pPr>
             <a:r>
-              <a:rPr lang="en" sz="2800" u="sng">
+              <a:rPr lang="en" sz="2800" u="sng" dirty="0">
                 <a:solidFill>
                   <a:schemeClr val="hlink"/>
                 </a:solidFill>
@@ -47427,7 +47591,7 @@
               </a:rPr>
               <a:t>Daily Schedule</a:t>
             </a:r>
-            <a:endParaRPr sz="2800"/>
+            <a:endParaRPr sz="2800" dirty="0"/>
           </a:p>
         </p:txBody>
       </p:sp>
@@ -47980,7 +48144,7 @@
               </a:rPr>
               <a:t>Daily Schedule</a:t>
             </a:r>
-            <a:endParaRPr/>
+            <a:endParaRPr dirty="0"/>
           </a:p>
         </p:txBody>
       </p:sp>

</xml_diff>